<commit_message>
fix the first page of ppt
</commit_message>
<xml_diff>
--- a/week5/week5_xsl_xpath.pptx
+++ b/week5/week5_xsl_xpath.pptx
@@ -219,7 +219,7 @@
           <a:p>
             <a:fld id="{0F9B84EA-7D68-4D60-9CB1-D50884785D1C}" type="datetimeFigureOut">
               <a:rPr lang="zh-CN" altLang="en-US" smtClean="0"/>
-              <a:t>2022/4/11</a:t>
+              <a:t>2022/4/12</a:t>
             </a:fld>
             <a:endParaRPr lang="zh-CN" altLang="en-US"/>
           </a:p>
@@ -384,7 +384,7 @@
           <a:p>
             <a:fld id="{D2A48B96-639E-45A3-A0BA-2464DFDB1FAA}" type="datetimeFigureOut">
               <a:rPr lang="zh-CN" altLang="en-US" smtClean="0"/>
-              <a:t>2022/4/11</a:t>
+              <a:t>2022/4/12</a:t>
             </a:fld>
             <a:endParaRPr lang="zh-CN" altLang="en-US"/>
           </a:p>
@@ -1491,7 +1491,7 @@
           <a:p>
             <a:fld id="{82F288E0-7875-42C4-84C8-98DBBD3BF4D2}" type="datetimeFigureOut">
               <a:rPr lang="zh-CN" altLang="en-US" smtClean="0"/>
-              <a:t>2022/4/11</a:t>
+              <a:t>2022/4/12</a:t>
             </a:fld>
             <a:endParaRPr lang="zh-CN" altLang="en-US"/>
           </a:p>
@@ -1544,6 +1544,9 @@
   <p:clrMapOvr>
     <a:masterClrMapping/>
   </p:clrMapOvr>
+  <p:transition spd="slow">
+    <p:push dir="u"/>
+  </p:transition>
 </p:sldLayout>
 </file>
 
@@ -1637,7 +1640,7 @@
           <a:p>
             <a:fld id="{82F288E0-7875-42C4-84C8-98DBBD3BF4D2}" type="datetimeFigureOut">
               <a:rPr lang="zh-CN" altLang="en-US" smtClean="0"/>
-              <a:t>2022/4/11</a:t>
+              <a:t>2022/4/12</a:t>
             </a:fld>
             <a:endParaRPr lang="zh-CN" altLang="en-US"/>
           </a:p>
@@ -1690,6 +1693,9 @@
   <p:clrMapOvr>
     <a:masterClrMapping/>
   </p:clrMapOvr>
+  <p:transition spd="slow">
+    <p:push dir="u"/>
+  </p:transition>
 </p:sldLayout>
 </file>
 
@@ -1763,7 +1769,7 @@
           <a:p>
             <a:fld id="{80F42DC0-2E3F-F440-A3AA-64F0AA1F84F2}" type="datetime1">
               <a:rPr lang="zh-CN" altLang="en-US"/>
-              <a:t>2022/4/11</a:t>
+              <a:t>2022/4/12</a:t>
             </a:fld>
             <a:endParaRPr lang="zh-CN" altLang="en-US" sz="1400">
               <a:solidFill>
@@ -1842,18 +1848,9 @@
   <p:clrMapOvr>
     <a:masterClrMapping/>
   </p:clrMapOvr>
-  <mc:AlternateContent xmlns:mc="http://schemas.openxmlformats.org/markup-compatibility/2006" xmlns:p14="http://schemas.microsoft.com/office/powerpoint/2010/main">
-    <mc:Choice Requires="p14">
-      <p:transition spd="slow" p14:dur="1500">
-        <p:random/>
-      </p:transition>
-    </mc:Choice>
-    <mc:Fallback xmlns="">
-      <p:transition spd="slow">
-        <p:random/>
-      </p:transition>
-    </mc:Fallback>
-  </mc:AlternateContent>
+  <p:transition spd="slow">
+    <p:push dir="u"/>
+  </p:transition>
 </p:sldLayout>
 </file>
 
@@ -1893,6 +1890,9 @@
   <p:clrMapOvr>
     <a:masterClrMapping/>
   </p:clrMapOvr>
+  <p:transition spd="slow">
+    <p:push dir="u"/>
+  </p:transition>
 </p:sldLayout>
 </file>
 
@@ -2080,7 +2080,7 @@
           <a:p>
             <a:fld id="{82F288E0-7875-42C4-84C8-98DBBD3BF4D2}" type="datetimeFigureOut">
               <a:rPr lang="zh-CN" altLang="en-US" smtClean="0"/>
-              <a:t>2022/4/11</a:t>
+              <a:t>2022/4/12</a:t>
             </a:fld>
             <a:endParaRPr lang="zh-CN" altLang="en-US"/>
           </a:p>
@@ -2133,6 +2133,9 @@
   <p:clrMapOvr>
     <a:masterClrMapping/>
   </p:clrMapOvr>
+  <p:transition spd="slow">
+    <p:push dir="u"/>
+  </p:transition>
 </p:sldLayout>
 </file>
 
@@ -2304,7 +2307,7 @@
           <a:p>
             <a:fld id="{82F288E0-7875-42C4-84C8-98DBBD3BF4D2}" type="datetimeFigureOut">
               <a:rPr lang="zh-CN" altLang="en-US" smtClean="0"/>
-              <a:t>2022/4/11</a:t>
+              <a:t>2022/4/12</a:t>
             </a:fld>
             <a:endParaRPr lang="zh-CN" altLang="en-US"/>
           </a:p>
@@ -2357,6 +2360,9 @@
   <p:clrMapOvr>
     <a:masterClrMapping/>
   </p:clrMapOvr>
+  <p:transition spd="slow">
+    <p:push dir="u"/>
+  </p:transition>
 </p:sldLayout>
 </file>
 
@@ -2663,7 +2669,7 @@
           <a:p>
             <a:fld id="{82F288E0-7875-42C4-84C8-98DBBD3BF4D2}" type="datetimeFigureOut">
               <a:rPr lang="zh-CN" altLang="en-US" smtClean="0"/>
-              <a:t>2022/4/11</a:t>
+              <a:t>2022/4/12</a:t>
             </a:fld>
             <a:endParaRPr lang="zh-CN" altLang="en-US"/>
           </a:p>
@@ -2716,6 +2722,9 @@
   <p:clrMapOvr>
     <a:masterClrMapping/>
   </p:clrMapOvr>
+  <p:transition spd="slow">
+    <p:push dir="u"/>
+  </p:transition>
 </p:sldLayout>
 </file>
 
@@ -2775,7 +2784,7 @@
           <a:p>
             <a:fld id="{82F288E0-7875-42C4-84C8-98DBBD3BF4D2}" type="datetimeFigureOut">
               <a:rPr lang="zh-CN" altLang="en-US" smtClean="0"/>
-              <a:t>2022/4/11</a:t>
+              <a:t>2022/4/12</a:t>
             </a:fld>
             <a:endParaRPr lang="zh-CN" altLang="en-US"/>
           </a:p>
@@ -2828,6 +2837,9 @@
   <p:clrMapOvr>
     <a:masterClrMapping/>
   </p:clrMapOvr>
+  <p:transition spd="slow">
+    <p:push dir="u"/>
+  </p:transition>
 </p:sldLayout>
 </file>
 
@@ -2865,7 +2877,7 @@
           <a:p>
             <a:fld id="{82F288E0-7875-42C4-84C8-98DBBD3BF4D2}" type="datetimeFigureOut">
               <a:rPr lang="zh-CN" altLang="en-US" smtClean="0"/>
-              <a:t>2022/4/11</a:t>
+              <a:t>2022/4/12</a:t>
             </a:fld>
             <a:endParaRPr lang="zh-CN" altLang="en-US"/>
           </a:p>
@@ -2918,6 +2930,9 @@
   <p:clrMapOvr>
     <a:masterClrMapping/>
   </p:clrMapOvr>
+  <p:transition spd="slow">
+    <p:push dir="u"/>
+  </p:transition>
 </p:sldLayout>
 </file>
 
@@ -3112,7 +3127,7 @@
           <a:p>
             <a:fld id="{82F288E0-7875-42C4-84C8-98DBBD3BF4D2}" type="datetimeFigureOut">
               <a:rPr lang="zh-CN" altLang="en-US" smtClean="0"/>
-              <a:t>2022/4/11</a:t>
+              <a:t>2022/4/12</a:t>
             </a:fld>
             <a:endParaRPr lang="zh-CN" altLang="en-US"/>
           </a:p>
@@ -3165,6 +3180,9 @@
   <p:clrMapOvr>
     <a:masterClrMapping/>
   </p:clrMapOvr>
+  <p:transition spd="slow">
+    <p:push dir="u"/>
+  </p:transition>
 </p:sldLayout>
 </file>
 
@@ -3285,7 +3303,7 @@
           <a:p>
             <a:fld id="{82F288E0-7875-42C4-84C8-98DBBD3BF4D2}" type="datetimeFigureOut">
               <a:rPr lang="zh-CN" altLang="en-US" smtClean="0"/>
-              <a:t>2022/4/11</a:t>
+              <a:t>2022/4/12</a:t>
             </a:fld>
             <a:endParaRPr lang="zh-CN" altLang="en-US"/>
           </a:p>
@@ -3338,6 +3356,9 @@
   <p:clrMapOvr>
     <a:masterClrMapping/>
   </p:clrMapOvr>
+  <p:transition spd="slow">
+    <p:push dir="u"/>
+  </p:transition>
 </p:sldLayout>
 </file>
 
@@ -3496,7 +3517,7 @@
           <a:p>
             <a:fld id="{82F288E0-7875-42C4-84C8-98DBBD3BF4D2}" type="datetimeFigureOut">
               <a:rPr lang="zh-CN" altLang="en-US" smtClean="0"/>
-              <a:t>2022/4/11</a:t>
+              <a:t>2022/4/12</a:t>
             </a:fld>
             <a:endParaRPr lang="zh-CN" altLang="en-US"/>
           </a:p>
@@ -3596,6 +3617,9 @@
     <p:sldLayoutId id="2147483658" r:id="rId10"/>
     <p:sldLayoutId id="2147483659" r:id="rId11"/>
   </p:sldLayoutIdLst>
+  <p:transition spd="slow">
+    <p:push dir="u"/>
+  </p:transition>
   <p:txStyles>
     <p:titleStyle>
       <a:lvl1pPr algn="l" defTabSz="685800" rtl="0" eaLnBrk="1" latinLnBrk="0" hangingPunct="1">
@@ -3950,7 +3974,7 @@
                 <a:cs typeface="+mn-ea"/>
                 <a:sym typeface="+mn-lt"/>
               </a:rPr>
-              <a:t>研讨：</a:t>
+              <a:t>第二次研讨：</a:t>
             </a:r>
             <a:r>
               <a:rPr lang="en-US" altLang="zh-CN" sz="4200" b="1" dirty="0">
@@ -3962,16 +3986,13 @@
               </a:rPr>
               <a:t>XSL</a:t>
             </a:r>
-            <a:r>
-              <a:rPr lang="zh-CN" altLang="en-US" sz="4200" b="1" dirty="0">
-                <a:solidFill>
-                  <a:srgbClr val="1B4367"/>
-                </a:solidFill>
-                <a:cs typeface="+mn-ea"/>
-                <a:sym typeface="+mn-lt"/>
-              </a:rPr>
-              <a:t>使用</a:t>
-            </a:r>
+            <a:endParaRPr lang="zh-CN" altLang="en-US" sz="4200" b="1" dirty="0">
+              <a:solidFill>
+                <a:srgbClr val="1B4367"/>
+              </a:solidFill>
+              <a:cs typeface="+mn-ea"/>
+              <a:sym typeface="+mn-lt"/>
+            </a:endParaRPr>
           </a:p>
         </p:txBody>
       </p:sp>
@@ -3984,7 +4005,7 @@
         <p:spPr>
           <a:xfrm>
             <a:off x="3404878" y="3196479"/>
-            <a:ext cx="3461808" cy="252730"/>
+            <a:ext cx="3461808" cy="807913"/>
           </a:xfrm>
           <a:prstGeom prst="rect">
             <a:avLst/>
@@ -4014,7 +4035,7 @@
                 <a:cs typeface="+mn-ea"/>
                 <a:sym typeface="+mn-lt"/>
               </a:rPr>
-              <a:t>汇报人：</a:t>
+              <a:t>组名：</a:t>
             </a:r>
             <a:r>
               <a:rPr lang="en-US" altLang="zh-CN" sz="1200" dirty="0">
@@ -4040,7 +4061,33 @@
                 <a:cs typeface="+mn-ea"/>
                 <a:sym typeface="+mn-lt"/>
               </a:rPr>
-              <a:t>    汇报时间：</a:t>
+              <a:t>      </a:t>
+            </a:r>
+            <a:r>
+              <a:rPr lang="en-US" altLang="zh-CN" sz="1200" dirty="0">
+                <a:solidFill>
+                  <a:schemeClr val="tx1">
+                    <a:lumMod val="75000"/>
+                    <a:lumOff val="25000"/>
+                  </a:schemeClr>
+                </a:solidFill>
+                <a:cs typeface="+mn-ea"/>
+                <a:sym typeface="+mn-lt"/>
+              </a:rPr>
+              <a:t>  </a:t>
+            </a:r>
+            <a:r>
+              <a:rPr lang="zh-CN" altLang="en-US" sz="1200" dirty="0">
+                <a:solidFill>
+                  <a:schemeClr val="tx1">
+                    <a:lumMod val="75000"/>
+                    <a:lumOff val="25000"/>
+                  </a:schemeClr>
+                </a:solidFill>
+                <a:cs typeface="+mn-ea"/>
+                <a:sym typeface="+mn-lt"/>
+              </a:rPr>
+              <a:t>汇报时间：</a:t>
             </a:r>
             <a:r>
               <a:rPr lang="en-US" altLang="zh-CN" sz="1200" dirty="0">
@@ -4094,6 +4141,68 @@
               </a:rPr>
               <a:t>月</a:t>
             </a:r>
+            <a:endParaRPr lang="en-US" altLang="zh-CN" sz="1200" dirty="0">
+              <a:solidFill>
+                <a:schemeClr val="tx1">
+                  <a:lumMod val="75000"/>
+                  <a:lumOff val="25000"/>
+                </a:schemeClr>
+              </a:solidFill>
+              <a:cs typeface="+mn-ea"/>
+              <a:sym typeface="+mn-lt"/>
+            </a:endParaRPr>
+          </a:p>
+          <a:p>
+            <a:pPr lvl="0" eaLnBrk="0" hangingPunct="0"/>
+            <a:endParaRPr lang="en-US" altLang="zh-CN" sz="1200" dirty="0">
+              <a:solidFill>
+                <a:schemeClr val="tx1">
+                  <a:lumMod val="75000"/>
+                  <a:lumOff val="25000"/>
+                </a:schemeClr>
+              </a:solidFill>
+              <a:cs typeface="+mn-ea"/>
+              <a:sym typeface="+mn-lt"/>
+            </a:endParaRPr>
+          </a:p>
+          <a:p>
+            <a:pPr lvl="0" eaLnBrk="0" hangingPunct="0"/>
+            <a:r>
+              <a:rPr lang="zh-CN" altLang="en-US" sz="1200" dirty="0">
+                <a:solidFill>
+                  <a:schemeClr val="tx1">
+                    <a:lumMod val="75000"/>
+                    <a:lumOff val="25000"/>
+                  </a:schemeClr>
+                </a:solidFill>
+                <a:cs typeface="+mn-ea"/>
+                <a:sym typeface="+mn-lt"/>
+              </a:rPr>
+              <a:t>成员：包亦成 王骏</a:t>
+            </a:r>
+            <a:endParaRPr lang="en-US" altLang="zh-CN" sz="1200" dirty="0">
+              <a:solidFill>
+                <a:schemeClr val="tx1">
+                  <a:lumMod val="75000"/>
+                  <a:lumOff val="25000"/>
+                </a:schemeClr>
+              </a:solidFill>
+              <a:cs typeface="+mn-ea"/>
+              <a:sym typeface="+mn-lt"/>
+            </a:endParaRPr>
+          </a:p>
+          <a:p>
+            <a:pPr lvl="0" eaLnBrk="0" hangingPunct="0"/>
+            <a:endParaRPr lang="zh-CN" altLang="en-US" sz="1200" dirty="0">
+              <a:solidFill>
+                <a:schemeClr val="tx1">
+                  <a:lumMod val="75000"/>
+                  <a:lumOff val="25000"/>
+                </a:schemeClr>
+              </a:solidFill>
+              <a:cs typeface="+mn-ea"/>
+              <a:sym typeface="+mn-lt"/>
+            </a:endParaRPr>
           </a:p>
         </p:txBody>
       </p:sp>
@@ -4121,6 +4230,16 @@
           <a:p>
             <a:pPr lvl="0" eaLnBrk="0" hangingPunct="0"/>
             <a:r>
+              <a:rPr lang="en-US" altLang="zh-CN" sz="1450">
+                <a:solidFill>
+                  <a:srgbClr val="1B4367"/>
+                </a:solidFill>
+                <a:cs typeface="+mn-ea"/>
+                <a:sym typeface="+mn-lt"/>
+              </a:rPr>
+              <a:t>Keywords</a:t>
+            </a:r>
+            <a:r>
               <a:rPr lang="en-US" altLang="zh-CN" sz="1450" dirty="0">
                 <a:solidFill>
                   <a:srgbClr val="1B4367"/>
@@ -4128,7 +4247,7 @@
                 <a:cs typeface="+mn-ea"/>
                 <a:sym typeface="+mn-lt"/>
               </a:rPr>
-              <a:t>Keywords: XSLT, </a:t>
+              <a:t>: XSLT, </a:t>
             </a:r>
             <a:r>
               <a:rPr lang="en-US" altLang="zh-CN" sz="1450" dirty="0" err="1">
@@ -4155,18 +4274,9 @@
   <p:clrMapOvr>
     <a:masterClrMapping/>
   </p:clrMapOvr>
-  <mc:AlternateContent xmlns:mc="http://schemas.openxmlformats.org/markup-compatibility/2006" xmlns:p14="http://schemas.microsoft.com/office/powerpoint/2010/main">
-    <mc:Choice Requires="p14">
-      <p:transition spd="slow" p14:dur="2000" advClick="0" advTm="0">
-        <p14:prism isContent="1"/>
-      </p:transition>
-    </mc:Choice>
-    <mc:Fallback xmlns="">
-      <p:transition spd="slow" advClick="0" advTm="0">
-        <p:fade/>
-      </p:transition>
-    </mc:Fallback>
-  </mc:AlternateContent>
+  <p:transition spd="slow">
+    <p:push dir="u"/>
+  </p:transition>
   <p:timing>
     <p:tnLst>
       <p:par>
@@ -4341,7 +4451,7 @@
                         <p:par>
                           <p:cTn id="12" fill="hold">
                             <p:stCondLst>
-                              <p:cond delay="1000"/>
+                              <p:cond delay="1050"/>
                             </p:stCondLst>
                             <p:childTnLst>
                               <p:par>
@@ -4495,7 +4605,7 @@
                         <p:par>
                           <p:cTn id="20" fill="hold">
                             <p:stCondLst>
-                              <p:cond delay="2400"/>
+                              <p:cond delay="2450"/>
                             </p:stCondLst>
                             <p:childTnLst>
                               <p:par>
@@ -4781,18 +4891,9 @@
   <p:clrMapOvr>
     <a:masterClrMapping/>
   </p:clrMapOvr>
-  <mc:AlternateContent xmlns:mc="http://schemas.openxmlformats.org/markup-compatibility/2006" xmlns:p14="http://schemas.microsoft.com/office/powerpoint/2010/main">
-    <mc:Choice Requires="p14">
-      <p:transition spd="slow" p14:dur="1600" advClick="0" advTm="0">
-        <p14:gallery dir="l"/>
-      </p:transition>
-    </mc:Choice>
-    <mc:Fallback xmlns="">
-      <p:transition spd="slow" advClick="0" advTm="0">
-        <p:fade/>
-      </p:transition>
-    </mc:Fallback>
-  </mc:AlternateContent>
+  <p:transition spd="slow">
+    <p:push dir="u"/>
+  </p:transition>
   <p:timing>
     <p:tnLst>
       <p:par>
@@ -5285,8 +5386,8 @@
   <p:clrMapOvr>
     <a:masterClrMapping/>
   </p:clrMapOvr>
-  <p:transition spd="slow" advClick="0" advTm="0">
-    <p:wipe/>
+  <p:transition spd="slow">
+    <p:push dir="u"/>
   </p:transition>
   <p:timing>
     <p:tnLst>
@@ -5676,18 +5777,9 @@
   <p:clrMapOvr>
     <a:masterClrMapping/>
   </p:clrMapOvr>
-  <mc:AlternateContent xmlns:mc="http://schemas.openxmlformats.org/markup-compatibility/2006" xmlns:p14="http://schemas.microsoft.com/office/powerpoint/2010/main">
-    <mc:Choice Requires="p14">
-      <p:transition spd="slow" p14:dur="2000" advClick="0" advTm="0">
-        <p14:prism isContent="1"/>
-      </p:transition>
-    </mc:Choice>
-    <mc:Fallback xmlns="">
-      <p:transition spd="slow" advClick="0" advTm="0">
-        <p:fade/>
-      </p:transition>
-    </mc:Fallback>
-  </mc:AlternateContent>
+  <p:transition spd="slow">
+    <p:push dir="u"/>
+  </p:transition>
   <p:timing>
     <p:tnLst>
       <p:par>
@@ -6076,18 +6168,9 @@
   <p:clrMapOvr>
     <a:masterClrMapping/>
   </p:clrMapOvr>
-  <mc:AlternateContent xmlns:mc="http://schemas.openxmlformats.org/markup-compatibility/2006" xmlns:p14="http://schemas.microsoft.com/office/powerpoint/2010/main">
-    <mc:Choice Requires="p14">
-      <p:transition spd="slow" p14:dur="1600" advClick="0" advTm="0">
-        <p14:gallery dir="l"/>
-      </p:transition>
-    </mc:Choice>
-    <mc:Fallback xmlns="">
-      <p:transition spd="slow" advClick="0" advTm="0">
-        <p:fade/>
-      </p:transition>
-    </mc:Fallback>
-  </mc:AlternateContent>
+  <p:transition spd="slow">
+    <p:push dir="u"/>
+  </p:transition>
   <p:timing>
     <p:tnLst>
       <p:par>
@@ -6516,18 +6599,9 @@
   <p:clrMapOvr>
     <a:masterClrMapping/>
   </p:clrMapOvr>
-  <mc:AlternateContent xmlns:mc="http://schemas.openxmlformats.org/markup-compatibility/2006" xmlns:p14="http://schemas.microsoft.com/office/powerpoint/2010/main">
-    <mc:Choice Requires="p14">
-      <p:transition spd="slow" p14:dur="1200" advClick="0" advTm="0">
-        <p14:flip dir="r"/>
-      </p:transition>
-    </mc:Choice>
-    <mc:Fallback xmlns="">
-      <p:transition spd="slow" advClick="0" advTm="0">
-        <p:fade/>
-      </p:transition>
-    </mc:Fallback>
-  </mc:AlternateContent>
+  <p:transition spd="slow">
+    <p:push dir="u"/>
+  </p:transition>
   <p:timing>
     <p:tnLst>
       <p:par>
@@ -8022,7 +8096,7 @@
   <p:clrMapOvr>
     <a:masterClrMapping/>
   </p:clrMapOvr>
-  <p:transition spd="slow" advClick="0" advTm="0">
+  <p:transition spd="slow">
     <p:push dir="u"/>
   </p:transition>
   <p:timing>
@@ -10033,7 +10107,7 @@
   <p:clrMapOvr>
     <a:masterClrMapping/>
   </p:clrMapOvr>
-  <p:transition spd="slow" advClick="0" advTm="0">
+  <p:transition spd="slow">
     <p:push dir="u"/>
   </p:transition>
   <p:timing>
@@ -10962,18 +11036,9 @@
   <p:clrMapOvr>
     <a:masterClrMapping/>
   </p:clrMapOvr>
-  <mc:AlternateContent xmlns:mc="http://schemas.openxmlformats.org/markup-compatibility/2006" xmlns:p14="http://schemas.microsoft.com/office/powerpoint/2010/main">
-    <mc:Choice Requires="p14">
-      <p:transition spd="med" p14:dur="700" advClick="0" advTm="0">
-        <p:fade/>
-      </p:transition>
-    </mc:Choice>
-    <mc:Fallback xmlns="">
-      <p:transition spd="med" advClick="0" advTm="0">
-        <p:fade/>
-      </p:transition>
-    </mc:Fallback>
-  </mc:AlternateContent>
+  <p:transition spd="slow">
+    <p:push dir="u"/>
+  </p:transition>
   <p:timing>
     <p:tnLst>
       <p:par>

</xml_diff>